<commit_message>
First version of the complete report
</commit_message>
<xml_diff>
--- a/docs/Temp_flowcahrts.pptx
+++ b/docs/Temp_flowcahrts.pptx
@@ -8,6 +8,7 @@
     <p:sldId id="256" r:id="rId2"/>
     <p:sldId id="257" r:id="rId3"/>
     <p:sldId id="258" r:id="rId4"/>
+    <p:sldId id="259" r:id="rId5"/>
   </p:sldIdLst>
   <p:sldSz cx="5376863" cy="7169150" type="B5ISO"/>
   <p:notesSz cx="6858000" cy="9144000"/>
@@ -245,7 +246,7 @@
           <a:p>
             <a:fld id="{91399AEF-60A9-A943-B104-3A1D3B79ECCC}" type="datetimeFigureOut">
               <a:rPr lang="de-DE" smtClean="0"/>
-              <a:t>11.09.19</a:t>
+              <a:t>12.09.19</a:t>
             </a:fld>
             <a:endParaRPr lang="de-DE"/>
           </a:p>
@@ -415,7 +416,7 @@
           <a:p>
             <a:fld id="{91399AEF-60A9-A943-B104-3A1D3B79ECCC}" type="datetimeFigureOut">
               <a:rPr lang="de-DE" smtClean="0"/>
-              <a:t>11.09.19</a:t>
+              <a:t>12.09.19</a:t>
             </a:fld>
             <a:endParaRPr lang="de-DE"/>
           </a:p>
@@ -595,7 +596,7 @@
           <a:p>
             <a:fld id="{91399AEF-60A9-A943-B104-3A1D3B79ECCC}" type="datetimeFigureOut">
               <a:rPr lang="de-DE" smtClean="0"/>
-              <a:t>11.09.19</a:t>
+              <a:t>12.09.19</a:t>
             </a:fld>
             <a:endParaRPr lang="de-DE"/>
           </a:p>
@@ -765,7 +766,7 @@
           <a:p>
             <a:fld id="{91399AEF-60A9-A943-B104-3A1D3B79ECCC}" type="datetimeFigureOut">
               <a:rPr lang="de-DE" smtClean="0"/>
-              <a:t>11.09.19</a:t>
+              <a:t>12.09.19</a:t>
             </a:fld>
             <a:endParaRPr lang="de-DE"/>
           </a:p>
@@ -1009,7 +1010,7 @@
           <a:p>
             <a:fld id="{91399AEF-60A9-A943-B104-3A1D3B79ECCC}" type="datetimeFigureOut">
               <a:rPr lang="de-DE" smtClean="0"/>
-              <a:t>11.09.19</a:t>
+              <a:t>12.09.19</a:t>
             </a:fld>
             <a:endParaRPr lang="de-DE"/>
           </a:p>
@@ -1241,7 +1242,7 @@
           <a:p>
             <a:fld id="{91399AEF-60A9-A943-B104-3A1D3B79ECCC}" type="datetimeFigureOut">
               <a:rPr lang="de-DE" smtClean="0"/>
-              <a:t>11.09.19</a:t>
+              <a:t>12.09.19</a:t>
             </a:fld>
             <a:endParaRPr lang="de-DE"/>
           </a:p>
@@ -1608,7 +1609,7 @@
           <a:p>
             <a:fld id="{91399AEF-60A9-A943-B104-3A1D3B79ECCC}" type="datetimeFigureOut">
               <a:rPr lang="de-DE" smtClean="0"/>
-              <a:t>11.09.19</a:t>
+              <a:t>12.09.19</a:t>
             </a:fld>
             <a:endParaRPr lang="de-DE"/>
           </a:p>
@@ -1726,7 +1727,7 @@
           <a:p>
             <a:fld id="{91399AEF-60A9-A943-B104-3A1D3B79ECCC}" type="datetimeFigureOut">
               <a:rPr lang="de-DE" smtClean="0"/>
-              <a:t>11.09.19</a:t>
+              <a:t>12.09.19</a:t>
             </a:fld>
             <a:endParaRPr lang="de-DE"/>
           </a:p>
@@ -1821,7 +1822,7 @@
           <a:p>
             <a:fld id="{91399AEF-60A9-A943-B104-3A1D3B79ECCC}" type="datetimeFigureOut">
               <a:rPr lang="de-DE" smtClean="0"/>
-              <a:t>11.09.19</a:t>
+              <a:t>12.09.19</a:t>
             </a:fld>
             <a:endParaRPr lang="de-DE"/>
           </a:p>
@@ -2098,7 +2099,7 @@
           <a:p>
             <a:fld id="{91399AEF-60A9-A943-B104-3A1D3B79ECCC}" type="datetimeFigureOut">
               <a:rPr lang="de-DE" smtClean="0"/>
-              <a:t>11.09.19</a:t>
+              <a:t>12.09.19</a:t>
             </a:fld>
             <a:endParaRPr lang="de-DE"/>
           </a:p>
@@ -2355,7 +2356,7 @@
           <a:p>
             <a:fld id="{91399AEF-60A9-A943-B104-3A1D3B79ECCC}" type="datetimeFigureOut">
               <a:rPr lang="de-DE" smtClean="0"/>
-              <a:t>11.09.19</a:t>
+              <a:t>12.09.19</a:t>
             </a:fld>
             <a:endParaRPr lang="de-DE"/>
           </a:p>
@@ -2568,7 +2569,7 @@
           <a:p>
             <a:fld id="{91399AEF-60A9-A943-B104-3A1D3B79ECCC}" type="datetimeFigureOut">
               <a:rPr lang="de-DE" smtClean="0"/>
-              <a:t>11.09.19</a:t>
+              <a:t>12.09.19</a:t>
             </a:fld>
             <a:endParaRPr lang="de-DE"/>
           </a:p>
@@ -5119,6 +5120,742 @@
 </p:sld>
 </file>
 
+<file path=ppt/slides/slide4.xml><?xml version="1.0" encoding="utf-8"?>
+<p:sld xmlns:a="http://schemas.openxmlformats.org/drawingml/2006/main" xmlns:r="http://schemas.openxmlformats.org/officeDocument/2006/relationships" xmlns:p="http://schemas.openxmlformats.org/presentationml/2006/main">
+  <p:cSld>
+    <p:spTree>
+      <p:nvGrpSpPr>
+        <p:cNvPr id="1" name=""/>
+        <p:cNvGrpSpPr/>
+        <p:nvPr/>
+      </p:nvGrpSpPr>
+      <p:grpSpPr>
+        <a:xfrm>
+          <a:off x="0" y="0"/>
+          <a:ext cx="0" cy="0"/>
+          <a:chOff x="0" y="0"/>
+          <a:chExt cx="0" cy="0"/>
+        </a:xfrm>
+      </p:grpSpPr>
+      <p:sp>
+        <p:nvSpPr>
+          <p:cNvPr id="4" name="TextBox 3">
+            <a:extLst>
+              <a:ext uri="{FF2B5EF4-FFF2-40B4-BE49-F238E27FC236}">
+                <a16:creationId xmlns:a16="http://schemas.microsoft.com/office/drawing/2014/main" id="{5D829B0C-AC7A-CD41-9B90-879513C51E08}"/>
+              </a:ext>
+            </a:extLst>
+          </p:cNvPr>
+          <p:cNvSpPr txBox="1"/>
+          <p:nvPr/>
+        </p:nvSpPr>
+        <p:spPr>
+          <a:xfrm>
+            <a:off x="340489" y="290073"/>
+            <a:ext cx="1182060" cy="253916"/>
+          </a:xfrm>
+          <a:prstGeom prst="rect">
+            <a:avLst/>
+          </a:prstGeom>
+          <a:noFill/>
+        </p:spPr>
+        <p:txBody>
+          <a:bodyPr wrap="square" rtlCol="0">
+            <a:spAutoFit/>
+          </a:bodyPr>
+          <a:lstStyle/>
+          <a:p>
+            <a:r>
+              <a:rPr lang="de-DE" sz="1050" dirty="0"/>
+              <a:t>PCA / </a:t>
+            </a:r>
+            <a:r>
+              <a:rPr lang="de-DE" sz="1050" dirty="0" err="1"/>
+              <a:t>Dense</a:t>
+            </a:r>
+            <a:r>
+              <a:rPr lang="de-DE" sz="1050" dirty="0"/>
+              <a:t> Net</a:t>
+            </a:r>
+          </a:p>
+        </p:txBody>
+      </p:sp>
+      <p:sp>
+        <p:nvSpPr>
+          <p:cNvPr id="5" name="TextBox 4">
+            <a:extLst>
+              <a:ext uri="{FF2B5EF4-FFF2-40B4-BE49-F238E27FC236}">
+                <a16:creationId xmlns:a16="http://schemas.microsoft.com/office/drawing/2014/main" id="{0059B912-B780-BC43-AA74-7B6C2D997D4A}"/>
+              </a:ext>
+            </a:extLst>
+          </p:cNvPr>
+          <p:cNvSpPr txBox="1"/>
+          <p:nvPr/>
+        </p:nvSpPr>
+        <p:spPr>
+          <a:xfrm>
+            <a:off x="2771558" y="290073"/>
+            <a:ext cx="1182060" cy="253916"/>
+          </a:xfrm>
+          <a:prstGeom prst="rect">
+            <a:avLst/>
+          </a:prstGeom>
+          <a:noFill/>
+        </p:spPr>
+        <p:txBody>
+          <a:bodyPr wrap="square" rtlCol="0">
+            <a:spAutoFit/>
+          </a:bodyPr>
+          <a:lstStyle/>
+          <a:p>
+            <a:r>
+              <a:rPr lang="de-DE" sz="1050" dirty="0"/>
+              <a:t>PCA / 1D CNN</a:t>
+            </a:r>
+          </a:p>
+        </p:txBody>
+      </p:sp>
+      <p:sp>
+        <p:nvSpPr>
+          <p:cNvPr id="6" name="TextBox 5">
+            <a:extLst>
+              <a:ext uri="{FF2B5EF4-FFF2-40B4-BE49-F238E27FC236}">
+                <a16:creationId xmlns:a16="http://schemas.microsoft.com/office/drawing/2014/main" id="{17048C5D-3096-7F4F-AEF6-C4F073E036E6}"/>
+              </a:ext>
+            </a:extLst>
+          </p:cNvPr>
+          <p:cNvSpPr txBox="1"/>
+          <p:nvPr/>
+        </p:nvSpPr>
+        <p:spPr>
+          <a:xfrm>
+            <a:off x="367971" y="1821253"/>
+            <a:ext cx="1556133" cy="253916"/>
+          </a:xfrm>
+          <a:prstGeom prst="rect">
+            <a:avLst/>
+          </a:prstGeom>
+          <a:noFill/>
+        </p:spPr>
+        <p:txBody>
+          <a:bodyPr wrap="square" rtlCol="0">
+            <a:spAutoFit/>
+          </a:bodyPr>
+          <a:lstStyle/>
+          <a:p>
+            <a:r>
+              <a:rPr lang="de-DE" sz="1050" dirty="0" err="1"/>
+              <a:t>Spectograms</a:t>
+            </a:r>
+            <a:r>
+              <a:rPr lang="de-DE" sz="1050" dirty="0"/>
+              <a:t> / 2D CNN</a:t>
+            </a:r>
+          </a:p>
+        </p:txBody>
+      </p:sp>
+      <p:sp>
+        <p:nvSpPr>
+          <p:cNvPr id="7" name="TextBox 6">
+            <a:extLst>
+              <a:ext uri="{FF2B5EF4-FFF2-40B4-BE49-F238E27FC236}">
+                <a16:creationId xmlns:a16="http://schemas.microsoft.com/office/drawing/2014/main" id="{E8CA1E93-9224-4E4E-B31A-AC6E031CF1B6}"/>
+              </a:ext>
+            </a:extLst>
+          </p:cNvPr>
+          <p:cNvSpPr txBox="1"/>
+          <p:nvPr/>
+        </p:nvSpPr>
+        <p:spPr>
+          <a:xfrm>
+            <a:off x="2755379" y="1869473"/>
+            <a:ext cx="1556133" cy="253916"/>
+          </a:xfrm>
+          <a:prstGeom prst="rect">
+            <a:avLst/>
+          </a:prstGeom>
+          <a:noFill/>
+        </p:spPr>
+        <p:txBody>
+          <a:bodyPr wrap="square" rtlCol="0">
+            <a:spAutoFit/>
+          </a:bodyPr>
+          <a:lstStyle/>
+          <a:p>
+            <a:r>
+              <a:rPr lang="de-DE" sz="1050" dirty="0" err="1"/>
+              <a:t>Spectograms</a:t>
+            </a:r>
+            <a:r>
+              <a:rPr lang="de-DE" sz="1050" dirty="0"/>
+              <a:t> / VGG16</a:t>
+            </a:r>
+          </a:p>
+        </p:txBody>
+      </p:sp>
+      <p:pic>
+        <p:nvPicPr>
+          <p:cNvPr id="8" name="Picture 7">
+            <a:extLst>
+              <a:ext uri="{FF2B5EF4-FFF2-40B4-BE49-F238E27FC236}">
+                <a16:creationId xmlns:a16="http://schemas.microsoft.com/office/drawing/2014/main" id="{DE8F1DAB-90CF-694D-A19E-6A46D5DCE6CC}"/>
+              </a:ext>
+            </a:extLst>
+          </p:cNvPr>
+          <p:cNvPicPr>
+            <a:picLocks noChangeAspect="1"/>
+          </p:cNvPicPr>
+          <p:nvPr/>
+        </p:nvPicPr>
+        <p:blipFill>
+          <a:blip r:embed="rId2"/>
+          <a:stretch>
+            <a:fillRect/>
+          </a:stretch>
+        </p:blipFill>
+        <p:spPr>
+          <a:xfrm>
+            <a:off x="263235" y="543989"/>
+            <a:ext cx="2425196" cy="1198526"/>
+          </a:xfrm>
+          <a:prstGeom prst="rect">
+            <a:avLst/>
+          </a:prstGeom>
+        </p:spPr>
+      </p:pic>
+      <p:pic>
+        <p:nvPicPr>
+          <p:cNvPr id="10" name="Picture 9">
+            <a:extLst>
+              <a:ext uri="{FF2B5EF4-FFF2-40B4-BE49-F238E27FC236}">
+                <a16:creationId xmlns:a16="http://schemas.microsoft.com/office/drawing/2014/main" id="{11AC76DD-D092-3048-8DC8-A28F54A09685}"/>
+              </a:ext>
+            </a:extLst>
+          </p:cNvPr>
+          <p:cNvPicPr>
+            <a:picLocks noChangeAspect="1"/>
+          </p:cNvPicPr>
+          <p:nvPr/>
+        </p:nvPicPr>
+        <p:blipFill>
+          <a:blip r:embed="rId3"/>
+          <a:stretch>
+            <a:fillRect/>
+          </a:stretch>
+        </p:blipFill>
+        <p:spPr>
+          <a:xfrm>
+            <a:off x="2771558" y="561647"/>
+            <a:ext cx="2310389" cy="1163209"/>
+          </a:xfrm>
+          <a:prstGeom prst="rect">
+            <a:avLst/>
+          </a:prstGeom>
+        </p:spPr>
+      </p:pic>
+      <p:pic>
+        <p:nvPicPr>
+          <p:cNvPr id="11" name="Picture 10">
+            <a:extLst>
+              <a:ext uri="{FF2B5EF4-FFF2-40B4-BE49-F238E27FC236}">
+                <a16:creationId xmlns:a16="http://schemas.microsoft.com/office/drawing/2014/main" id="{909C143E-9C55-0E4A-9E54-CE54DD3FE1DF}"/>
+              </a:ext>
+            </a:extLst>
+          </p:cNvPr>
+          <p:cNvPicPr>
+            <a:picLocks noChangeAspect="1"/>
+          </p:cNvPicPr>
+          <p:nvPr/>
+        </p:nvPicPr>
+        <p:blipFill>
+          <a:blip r:embed="rId4"/>
+          <a:stretch>
+            <a:fillRect/>
+          </a:stretch>
+        </p:blipFill>
+        <p:spPr>
+          <a:xfrm>
+            <a:off x="340489" y="2123389"/>
+            <a:ext cx="2331763" cy="1198526"/>
+          </a:xfrm>
+          <a:prstGeom prst="rect">
+            <a:avLst/>
+          </a:prstGeom>
+        </p:spPr>
+      </p:pic>
+      <p:pic>
+        <p:nvPicPr>
+          <p:cNvPr id="12" name="Picture 11">
+            <a:extLst>
+              <a:ext uri="{FF2B5EF4-FFF2-40B4-BE49-F238E27FC236}">
+                <a16:creationId xmlns:a16="http://schemas.microsoft.com/office/drawing/2014/main" id="{4114E36F-381D-1747-8FAE-C1C6E666A7D1}"/>
+              </a:ext>
+            </a:extLst>
+          </p:cNvPr>
+          <p:cNvPicPr>
+            <a:picLocks noChangeAspect="1"/>
+          </p:cNvPicPr>
+          <p:nvPr/>
+        </p:nvPicPr>
+        <p:blipFill>
+          <a:blip r:embed="rId5"/>
+          <a:stretch>
+            <a:fillRect/>
+          </a:stretch>
+        </p:blipFill>
+        <p:spPr>
+          <a:xfrm>
+            <a:off x="2755379" y="2123389"/>
+            <a:ext cx="2413599" cy="1198526"/>
+          </a:xfrm>
+          <a:prstGeom prst="rect">
+            <a:avLst/>
+          </a:prstGeom>
+        </p:spPr>
+      </p:pic>
+      <p:sp>
+        <p:nvSpPr>
+          <p:cNvPr id="13" name="Rectangle 12">
+            <a:extLst>
+              <a:ext uri="{FF2B5EF4-FFF2-40B4-BE49-F238E27FC236}">
+                <a16:creationId xmlns:a16="http://schemas.microsoft.com/office/drawing/2014/main" id="{7AD157FF-D639-6844-9D95-5FFC54034458}"/>
+              </a:ext>
+            </a:extLst>
+          </p:cNvPr>
+          <p:cNvSpPr/>
+          <p:nvPr/>
+        </p:nvSpPr>
+        <p:spPr>
+          <a:xfrm>
+            <a:off x="473996" y="3574043"/>
+            <a:ext cx="360219" cy="73891"/>
+          </a:xfrm>
+          <a:prstGeom prst="rect">
+            <a:avLst/>
+          </a:prstGeom>
+        </p:spPr>
+        <p:style>
+          <a:lnRef idx="2">
+            <a:schemeClr val="accent1">
+              <a:shade val="50000"/>
+            </a:schemeClr>
+          </a:lnRef>
+          <a:fillRef idx="1">
+            <a:schemeClr val="accent1"/>
+          </a:fillRef>
+          <a:effectRef idx="0">
+            <a:schemeClr val="accent1"/>
+          </a:effectRef>
+          <a:fontRef idx="minor">
+            <a:schemeClr val="lt1"/>
+          </a:fontRef>
+        </p:style>
+        <p:txBody>
+          <a:bodyPr rtlCol="0" anchor="ctr"/>
+          <a:lstStyle/>
+          <a:p>
+            <a:pPr algn="ctr"/>
+            <a:endParaRPr lang="de-DE"/>
+          </a:p>
+        </p:txBody>
+      </p:sp>
+      <p:sp>
+        <p:nvSpPr>
+          <p:cNvPr id="14" name="TextBox 13">
+            <a:extLst>
+              <a:ext uri="{FF2B5EF4-FFF2-40B4-BE49-F238E27FC236}">
+                <a16:creationId xmlns:a16="http://schemas.microsoft.com/office/drawing/2014/main" id="{BC350F27-9E0D-7F48-94EE-A253AF53D466}"/>
+              </a:ext>
+            </a:extLst>
+          </p:cNvPr>
+          <p:cNvSpPr txBox="1"/>
+          <p:nvPr/>
+        </p:nvSpPr>
+        <p:spPr>
+          <a:xfrm>
+            <a:off x="834215" y="3484030"/>
+            <a:ext cx="803563" cy="253916"/>
+          </a:xfrm>
+          <a:prstGeom prst="rect">
+            <a:avLst/>
+          </a:prstGeom>
+          <a:noFill/>
+        </p:spPr>
+        <p:txBody>
+          <a:bodyPr wrap="square" rtlCol="0">
+            <a:spAutoFit/>
+          </a:bodyPr>
+          <a:lstStyle/>
+          <a:p>
+            <a:r>
+              <a:rPr lang="de-DE" sz="1050" dirty="0" err="1"/>
+              <a:t>Accuracy</a:t>
+            </a:r>
+            <a:endParaRPr lang="de-DE" sz="1050" dirty="0"/>
+          </a:p>
+        </p:txBody>
+      </p:sp>
+      <p:sp>
+        <p:nvSpPr>
+          <p:cNvPr id="16" name="Rectangle 15">
+            <a:extLst>
+              <a:ext uri="{FF2B5EF4-FFF2-40B4-BE49-F238E27FC236}">
+                <a16:creationId xmlns:a16="http://schemas.microsoft.com/office/drawing/2014/main" id="{C2844770-8FE8-314F-8C9C-A57CFE756A1E}"/>
+              </a:ext>
+            </a:extLst>
+          </p:cNvPr>
+          <p:cNvSpPr/>
+          <p:nvPr/>
+        </p:nvSpPr>
+        <p:spPr>
+          <a:xfrm>
+            <a:off x="1522516" y="3589662"/>
+            <a:ext cx="360219" cy="73891"/>
+          </a:xfrm>
+          <a:prstGeom prst="rect">
+            <a:avLst/>
+          </a:prstGeom>
+          <a:solidFill>
+            <a:schemeClr val="accent2"/>
+          </a:solidFill>
+          <a:ln>
+            <a:noFill/>
+          </a:ln>
+        </p:spPr>
+        <p:style>
+          <a:lnRef idx="2">
+            <a:schemeClr val="accent1">
+              <a:shade val="50000"/>
+            </a:schemeClr>
+          </a:lnRef>
+          <a:fillRef idx="1">
+            <a:schemeClr val="accent1"/>
+          </a:fillRef>
+          <a:effectRef idx="0">
+            <a:schemeClr val="accent1"/>
+          </a:effectRef>
+          <a:fontRef idx="minor">
+            <a:schemeClr val="lt1"/>
+          </a:fontRef>
+        </p:style>
+        <p:txBody>
+          <a:bodyPr rtlCol="0" anchor="ctr"/>
+          <a:lstStyle/>
+          <a:p>
+            <a:pPr algn="ctr"/>
+            <a:endParaRPr lang="de-DE"/>
+          </a:p>
+        </p:txBody>
+      </p:sp>
+      <p:sp>
+        <p:nvSpPr>
+          <p:cNvPr id="17" name="TextBox 16">
+            <a:extLst>
+              <a:ext uri="{FF2B5EF4-FFF2-40B4-BE49-F238E27FC236}">
+                <a16:creationId xmlns:a16="http://schemas.microsoft.com/office/drawing/2014/main" id="{E4DF08AA-5418-FC40-AEFC-38577A7D1932}"/>
+              </a:ext>
+            </a:extLst>
+          </p:cNvPr>
+          <p:cNvSpPr txBox="1"/>
+          <p:nvPr/>
+        </p:nvSpPr>
+        <p:spPr>
+          <a:xfrm>
+            <a:off x="1868881" y="3499649"/>
+            <a:ext cx="803563" cy="253916"/>
+          </a:xfrm>
+          <a:prstGeom prst="rect">
+            <a:avLst/>
+          </a:prstGeom>
+          <a:noFill/>
+        </p:spPr>
+        <p:txBody>
+          <a:bodyPr wrap="square" rtlCol="0">
+            <a:spAutoFit/>
+          </a:bodyPr>
+          <a:lstStyle/>
+          <a:p>
+            <a:r>
+              <a:rPr lang="de-DE" sz="1050" dirty="0"/>
+              <a:t>Recall</a:t>
+            </a:r>
+          </a:p>
+        </p:txBody>
+      </p:sp>
+      <p:sp>
+        <p:nvSpPr>
+          <p:cNvPr id="18" name="Rectangle 17">
+            <a:extLst>
+              <a:ext uri="{FF2B5EF4-FFF2-40B4-BE49-F238E27FC236}">
+                <a16:creationId xmlns:a16="http://schemas.microsoft.com/office/drawing/2014/main" id="{627FEA9E-063D-1643-941E-1D7D2D8909FC}"/>
+              </a:ext>
+            </a:extLst>
+          </p:cNvPr>
+          <p:cNvSpPr/>
+          <p:nvPr/>
+        </p:nvSpPr>
+        <p:spPr>
+          <a:xfrm>
+            <a:off x="2385825" y="3589662"/>
+            <a:ext cx="360219" cy="73891"/>
+          </a:xfrm>
+          <a:prstGeom prst="rect">
+            <a:avLst/>
+          </a:prstGeom>
+          <a:solidFill>
+            <a:schemeClr val="accent6"/>
+          </a:solidFill>
+          <a:ln>
+            <a:noFill/>
+          </a:ln>
+        </p:spPr>
+        <p:style>
+          <a:lnRef idx="2">
+            <a:schemeClr val="accent1">
+              <a:shade val="50000"/>
+            </a:schemeClr>
+          </a:lnRef>
+          <a:fillRef idx="1">
+            <a:schemeClr val="accent1"/>
+          </a:fillRef>
+          <a:effectRef idx="0">
+            <a:schemeClr val="accent1"/>
+          </a:effectRef>
+          <a:fontRef idx="minor">
+            <a:schemeClr val="lt1"/>
+          </a:fontRef>
+        </p:style>
+        <p:txBody>
+          <a:bodyPr rtlCol="0" anchor="ctr"/>
+          <a:lstStyle/>
+          <a:p>
+            <a:pPr algn="ctr"/>
+            <a:endParaRPr lang="de-DE"/>
+          </a:p>
+        </p:txBody>
+      </p:sp>
+      <p:sp>
+        <p:nvSpPr>
+          <p:cNvPr id="19" name="TextBox 18">
+            <a:extLst>
+              <a:ext uri="{FF2B5EF4-FFF2-40B4-BE49-F238E27FC236}">
+                <a16:creationId xmlns:a16="http://schemas.microsoft.com/office/drawing/2014/main" id="{1FE518F9-D69E-014D-A31E-7E071092DC3E}"/>
+              </a:ext>
+            </a:extLst>
+          </p:cNvPr>
+          <p:cNvSpPr txBox="1"/>
+          <p:nvPr/>
+        </p:nvSpPr>
+        <p:spPr>
+          <a:xfrm>
+            <a:off x="2746044" y="3499649"/>
+            <a:ext cx="803563" cy="253916"/>
+          </a:xfrm>
+          <a:prstGeom prst="rect">
+            <a:avLst/>
+          </a:prstGeom>
+          <a:noFill/>
+        </p:spPr>
+        <p:txBody>
+          <a:bodyPr wrap="square" rtlCol="0">
+            <a:spAutoFit/>
+          </a:bodyPr>
+          <a:lstStyle/>
+          <a:p>
+            <a:r>
+              <a:rPr lang="de-DE" sz="1050" dirty="0"/>
+              <a:t>Precision</a:t>
+            </a:r>
+          </a:p>
+        </p:txBody>
+      </p:sp>
+      <p:sp>
+        <p:nvSpPr>
+          <p:cNvPr id="20" name="Rectangle 19">
+            <a:extLst>
+              <a:ext uri="{FF2B5EF4-FFF2-40B4-BE49-F238E27FC236}">
+                <a16:creationId xmlns:a16="http://schemas.microsoft.com/office/drawing/2014/main" id="{9C890FA8-23BF-D54D-AA53-BA1C05E850EC}"/>
+              </a:ext>
+            </a:extLst>
+          </p:cNvPr>
+          <p:cNvSpPr/>
+          <p:nvPr/>
+        </p:nvSpPr>
+        <p:spPr>
+          <a:xfrm>
+            <a:off x="3486079" y="3610988"/>
+            <a:ext cx="360219" cy="73891"/>
+          </a:xfrm>
+          <a:prstGeom prst="rect">
+            <a:avLst/>
+          </a:prstGeom>
+          <a:solidFill>
+            <a:srgbClr val="FF0000"/>
+          </a:solidFill>
+          <a:ln>
+            <a:noFill/>
+          </a:ln>
+        </p:spPr>
+        <p:style>
+          <a:lnRef idx="2">
+            <a:schemeClr val="accent1">
+              <a:shade val="50000"/>
+            </a:schemeClr>
+          </a:lnRef>
+          <a:fillRef idx="1">
+            <a:schemeClr val="accent1"/>
+          </a:fillRef>
+          <a:effectRef idx="0">
+            <a:schemeClr val="accent1"/>
+          </a:effectRef>
+          <a:fontRef idx="minor">
+            <a:schemeClr val="lt1"/>
+          </a:fontRef>
+        </p:style>
+        <p:txBody>
+          <a:bodyPr rtlCol="0" anchor="ctr"/>
+          <a:lstStyle/>
+          <a:p>
+            <a:pPr algn="ctr"/>
+            <a:endParaRPr lang="de-DE"/>
+          </a:p>
+        </p:txBody>
+      </p:sp>
+      <p:sp>
+        <p:nvSpPr>
+          <p:cNvPr id="21" name="TextBox 20">
+            <a:extLst>
+              <a:ext uri="{FF2B5EF4-FFF2-40B4-BE49-F238E27FC236}">
+                <a16:creationId xmlns:a16="http://schemas.microsoft.com/office/drawing/2014/main" id="{121E6388-6B1E-F943-B42C-EC7F0977CD44}"/>
+              </a:ext>
+            </a:extLst>
+          </p:cNvPr>
+          <p:cNvSpPr txBox="1"/>
+          <p:nvPr/>
+        </p:nvSpPr>
+        <p:spPr>
+          <a:xfrm>
+            <a:off x="3846298" y="3520975"/>
+            <a:ext cx="803563" cy="253916"/>
+          </a:xfrm>
+          <a:prstGeom prst="rect">
+            <a:avLst/>
+          </a:prstGeom>
+          <a:noFill/>
+        </p:spPr>
+        <p:txBody>
+          <a:bodyPr wrap="square" rtlCol="0">
+            <a:spAutoFit/>
+          </a:bodyPr>
+          <a:lstStyle/>
+          <a:p>
+            <a:r>
+              <a:rPr lang="de-DE" sz="1050" dirty="0"/>
+              <a:t>F1</a:t>
+            </a:r>
+          </a:p>
+        </p:txBody>
+      </p:sp>
+      <p:sp>
+        <p:nvSpPr>
+          <p:cNvPr id="22" name="Rectangle 21">
+            <a:extLst>
+              <a:ext uri="{FF2B5EF4-FFF2-40B4-BE49-F238E27FC236}">
+                <a16:creationId xmlns:a16="http://schemas.microsoft.com/office/drawing/2014/main" id="{5E1F7941-B096-1548-976F-A90F0E2AEADC}"/>
+              </a:ext>
+            </a:extLst>
+          </p:cNvPr>
+          <p:cNvSpPr/>
+          <p:nvPr/>
+        </p:nvSpPr>
+        <p:spPr>
+          <a:xfrm>
+            <a:off x="4243344" y="3599293"/>
+            <a:ext cx="360219" cy="73891"/>
+          </a:xfrm>
+          <a:prstGeom prst="rect">
+            <a:avLst/>
+          </a:prstGeom>
+          <a:solidFill>
+            <a:srgbClr val="7030A0"/>
+          </a:solidFill>
+          <a:ln>
+            <a:noFill/>
+          </a:ln>
+        </p:spPr>
+        <p:style>
+          <a:lnRef idx="2">
+            <a:schemeClr val="accent1">
+              <a:shade val="50000"/>
+            </a:schemeClr>
+          </a:lnRef>
+          <a:fillRef idx="1">
+            <a:schemeClr val="accent1"/>
+          </a:fillRef>
+          <a:effectRef idx="0">
+            <a:schemeClr val="accent1"/>
+          </a:effectRef>
+          <a:fontRef idx="minor">
+            <a:schemeClr val="lt1"/>
+          </a:fontRef>
+        </p:style>
+        <p:txBody>
+          <a:bodyPr rtlCol="0" anchor="ctr"/>
+          <a:lstStyle/>
+          <a:p>
+            <a:pPr algn="ctr"/>
+            <a:endParaRPr lang="de-DE"/>
+          </a:p>
+        </p:txBody>
+      </p:sp>
+      <p:sp>
+        <p:nvSpPr>
+          <p:cNvPr id="23" name="TextBox 22">
+            <a:extLst>
+              <a:ext uri="{FF2B5EF4-FFF2-40B4-BE49-F238E27FC236}">
+                <a16:creationId xmlns:a16="http://schemas.microsoft.com/office/drawing/2014/main" id="{8D3D16F4-59EF-6C4E-ACB0-CD4457E243E6}"/>
+              </a:ext>
+            </a:extLst>
+          </p:cNvPr>
+          <p:cNvSpPr txBox="1"/>
+          <p:nvPr/>
+        </p:nvSpPr>
+        <p:spPr>
+          <a:xfrm>
+            <a:off x="4649861" y="3499649"/>
+            <a:ext cx="803563" cy="253916"/>
+          </a:xfrm>
+          <a:prstGeom prst="rect">
+            <a:avLst/>
+          </a:prstGeom>
+          <a:noFill/>
+        </p:spPr>
+        <p:txBody>
+          <a:bodyPr wrap="square" rtlCol="0">
+            <a:spAutoFit/>
+          </a:bodyPr>
+          <a:lstStyle/>
+          <a:p>
+            <a:r>
+              <a:rPr lang="de-DE" sz="1050" dirty="0"/>
+              <a:t>MCC</a:t>
+            </a:r>
+          </a:p>
+        </p:txBody>
+      </p:sp>
+    </p:spTree>
+    <p:extLst>
+      <p:ext uri="{BB962C8B-B14F-4D97-AF65-F5344CB8AC3E}">
+        <p14:creationId xmlns:p14="http://schemas.microsoft.com/office/powerpoint/2010/main" val="3032446634"/>
+      </p:ext>
+    </p:extLst>
+  </p:cSld>
+  <p:clrMapOvr>
+    <a:masterClrMapping/>
+  </p:clrMapOvr>
+</p:sld>
+</file>
+
 <file path=ppt/theme/theme1.xml><?xml version="1.0" encoding="utf-8"?>
 <a:theme xmlns:a="http://schemas.openxmlformats.org/drawingml/2006/main" name="Office Theme">
   <a:themeElements>

</xml_diff>